<commit_message>
Last Update 16-11-2018  6:57:25.05
</commit_message>
<xml_diff>
--- a/Lab/Ex 5 A Linear-Search/GE8151-E5A-Flowchart.pptx
+++ b/Lab/Ex 5 A Linear-Search/GE8151-E5A-Flowchart.pptx
@@ -196,7 +196,7 @@
             <a:fld id="{5DF6688B-E7FC-4296-98AB-DDD1B8D062EB}" type="datetimeFigureOut">
               <a:rPr lang="en-US" smtClean="0"/>
               <a:pPr/>
-              <a:t>11/15/2018</a:t>
+              <a:t>11/16/2018</a:t>
             </a:fld>
             <a:endParaRPr lang="en-US"/>
           </a:p>
@@ -644,7 +644,7 @@
             <a:fld id="{A9953F39-409C-4934-84CB-8EF94422C604}" type="datetimeFigureOut">
               <a:rPr lang="en-US" smtClean="0"/>
               <a:pPr/>
-              <a:t>11/15/2018</a:t>
+              <a:t>11/16/2018</a:t>
             </a:fld>
             <a:endParaRPr lang="en-US"/>
           </a:p>
@@ -811,7 +811,7 @@
             <a:fld id="{A9953F39-409C-4934-84CB-8EF94422C604}" type="datetimeFigureOut">
               <a:rPr lang="en-US" smtClean="0"/>
               <a:pPr/>
-              <a:t>11/15/2018</a:t>
+              <a:t>11/16/2018</a:t>
             </a:fld>
             <a:endParaRPr lang="en-US"/>
           </a:p>
@@ -988,7 +988,7 @@
             <a:fld id="{A9953F39-409C-4934-84CB-8EF94422C604}" type="datetimeFigureOut">
               <a:rPr lang="en-US" smtClean="0"/>
               <a:pPr/>
-              <a:t>11/15/2018</a:t>
+              <a:t>11/16/2018</a:t>
             </a:fld>
             <a:endParaRPr lang="en-US"/>
           </a:p>
@@ -1155,7 +1155,7 @@
             <a:fld id="{A9953F39-409C-4934-84CB-8EF94422C604}" type="datetimeFigureOut">
               <a:rPr lang="en-US" smtClean="0"/>
               <a:pPr/>
-              <a:t>11/15/2018</a:t>
+              <a:t>11/16/2018</a:t>
             </a:fld>
             <a:endParaRPr lang="en-US"/>
           </a:p>
@@ -1398,7 +1398,7 @@
             <a:fld id="{A9953F39-409C-4934-84CB-8EF94422C604}" type="datetimeFigureOut">
               <a:rPr lang="en-US" smtClean="0"/>
               <a:pPr/>
-              <a:t>11/15/2018</a:t>
+              <a:t>11/16/2018</a:t>
             </a:fld>
             <a:endParaRPr lang="en-US"/>
           </a:p>
@@ -1683,7 +1683,7 @@
             <a:fld id="{A9953F39-409C-4934-84CB-8EF94422C604}" type="datetimeFigureOut">
               <a:rPr lang="en-US" smtClean="0"/>
               <a:pPr/>
-              <a:t>11/15/2018</a:t>
+              <a:t>11/16/2018</a:t>
             </a:fld>
             <a:endParaRPr lang="en-US"/>
           </a:p>
@@ -2102,7 +2102,7 @@
             <a:fld id="{A9953F39-409C-4934-84CB-8EF94422C604}" type="datetimeFigureOut">
               <a:rPr lang="en-US" smtClean="0"/>
               <a:pPr/>
-              <a:t>11/15/2018</a:t>
+              <a:t>11/16/2018</a:t>
             </a:fld>
             <a:endParaRPr lang="en-US"/>
           </a:p>
@@ -2217,7 +2217,7 @@
             <a:fld id="{A9953F39-409C-4934-84CB-8EF94422C604}" type="datetimeFigureOut">
               <a:rPr lang="en-US" smtClean="0"/>
               <a:pPr/>
-              <a:t>11/15/2018</a:t>
+              <a:t>11/16/2018</a:t>
             </a:fld>
             <a:endParaRPr lang="en-US"/>
           </a:p>
@@ -2309,7 +2309,7 @@
             <a:fld id="{A9953F39-409C-4934-84CB-8EF94422C604}" type="datetimeFigureOut">
               <a:rPr lang="en-US" smtClean="0"/>
               <a:pPr/>
-              <a:t>11/15/2018</a:t>
+              <a:t>11/16/2018</a:t>
             </a:fld>
             <a:endParaRPr lang="en-US"/>
           </a:p>
@@ -2583,7 +2583,7 @@
             <a:fld id="{A9953F39-409C-4934-84CB-8EF94422C604}" type="datetimeFigureOut">
               <a:rPr lang="en-US" smtClean="0"/>
               <a:pPr/>
-              <a:t>11/15/2018</a:t>
+              <a:t>11/16/2018</a:t>
             </a:fld>
             <a:endParaRPr lang="en-US"/>
           </a:p>
@@ -2833,7 +2833,7 @@
             <a:fld id="{A9953F39-409C-4934-84CB-8EF94422C604}" type="datetimeFigureOut">
               <a:rPr lang="en-US" smtClean="0"/>
               <a:pPr/>
-              <a:t>11/15/2018</a:t>
+              <a:t>11/16/2018</a:t>
             </a:fld>
             <a:endParaRPr lang="en-US"/>
           </a:p>
@@ -3043,7 +3043,7 @@
             <a:fld id="{A9953F39-409C-4934-84CB-8EF94422C604}" type="datetimeFigureOut">
               <a:rPr lang="en-US" smtClean="0"/>
               <a:pPr/>
-              <a:t>11/15/2018</a:t>
+              <a:t>11/16/2018</a:t>
             </a:fld>
             <a:endParaRPr lang="en-US"/>
           </a:p>
@@ -5067,7 +5067,6 @@
                 <a:rPr lang="en-IN" dirty="0" smtClean="0"/>
                 <a:t>found = False</a:t>
               </a:r>
-              <a:endParaRPr lang="en-IN" dirty="0" smtClean="0"/>
             </a:p>
           </p:txBody>
         </p:sp>
@@ -5326,7 +5325,6 @@
                 <a:rPr lang="en-US" dirty="0" smtClean="0"/>
                 <a:t>Found</a:t>
               </a:r>
-              <a:endParaRPr lang="en-US" dirty="0" smtClean="0"/>
             </a:p>
           </p:txBody>
         </p:sp>
@@ -5591,12 +5589,12 @@
                 <a:t>element </a:t>
               </a:r>
               <a:r>
-                <a:rPr lang="en-IN" dirty="0" smtClean="0"/>
+                <a:rPr lang="en-IN" smtClean="0"/>
                 <a:t>== </a:t>
               </a:r>
               <a:r>
-                <a:rPr lang="en-IN" dirty="0" smtClean="0"/>
-                <a:t>max</a:t>
+                <a:rPr lang="en-IN" smtClean="0"/>
+                <a:t>key</a:t>
               </a:r>
               <a:endParaRPr lang="en-US" dirty="0"/>
             </a:p>
@@ -5742,11 +5740,7 @@
               <a:pPr algn="ctr"/>
               <a:r>
                 <a:rPr lang="en-IN" dirty="0" smtClean="0"/>
-                <a:t>read  </a:t>
-              </a:r>
-              <a:r>
-                <a:rPr lang="en-IN" dirty="0" smtClean="0"/>
-                <a:t>key</a:t>
+                <a:t>read  key</a:t>
               </a:r>
               <a:endParaRPr lang="en-US" dirty="0"/>
             </a:p>
@@ -5826,7 +5820,6 @@
                 <a:rPr lang="en-IN" dirty="0" smtClean="0"/>
                 <a:t>found = True</a:t>
               </a:r>
-              <a:endParaRPr lang="en-IN" dirty="0" smtClean="0"/>
             </a:p>
           </p:txBody>
         </p:sp>
@@ -5904,7 +5897,6 @@
                 <a:rPr lang="en-US" dirty="0" smtClean="0"/>
                 <a:t>Not Found</a:t>
               </a:r>
-              <a:endParaRPr lang="en-US" dirty="0" smtClean="0"/>
             </a:p>
           </p:txBody>
         </p:sp>

</xml_diff>